<commit_message>
vault backup: 2026-02-26 11:18:09
</commit_message>
<xml_diff>
--- a/05_Output/Projects/@Active/Kyoritsu-Seiyaku-DX/02-materials/共立製薬-統合提案-スコアシートDX+データ基盤_NTTDXPN.pptx
+++ b/05_Output/Projects/@Active/Kyoritsu-Seiyaku-DX/02-materials/共立製薬-統合提案-スコアシートDX+データ基盤_NTTDXPN.pptx
@@ -3,24 +3,25 @@
 <p:presentation xmlns:a="http://schemas.openxmlformats.org/drawingml/2006/main" xmlns:r="http://schemas.openxmlformats.org/officeDocument/2006/relationships" xmlns:p="http://schemas.openxmlformats.org/presentationml/2006/main" firstSlideNum="0" strictFirstAndLastChars="0" saveSubsetFonts="1" autoCompressPictures="0">
   <p:sldMasterIdLst>
     <p:sldMasterId id="2147483648" r:id="rId4"/>
+    <p:sldMasterId id="2147483649" r:id="rId30"/>
   </p:sldMasterIdLst>
   <p:notesMasterIdLst>
     <p:notesMasterId r:id="rId10"/>
   </p:notesMasterIdLst>
   <p:sldIdLst>
-    <p:sldId id="257" r:id="rId16"/>
-    <p:sldId id="258" r:id="rId15"/>
-    <p:sldId id="259" r:id="rId14"/>
-    <p:sldId id="260" r:id="rId13"/>
-    <p:sldId id="261" r:id="rId12"/>
-    <p:sldId id="262" r:id="rId23"/>
-    <p:sldId id="263" r:id="rId24"/>
-    <p:sldId id="264" r:id="rId25"/>
-    <p:sldId id="265" r:id="rId26"/>
-    <p:sldId id="266" r:id="rId27"/>
-    <p:sldId id="267" r:id="rId28"/>
-    <p:sldId id="268" r:id="rId29"/>
-    <p:sldId id="269" r:id="rId30"/>
+    <p:sldId id="300" r:id="rId40"/>
+    <p:sldId id="301" r:id="rId41"/>
+    <p:sldId id="302" r:id="rId42"/>
+    <p:sldId id="303" r:id="rId43"/>
+    <p:sldId id="304" r:id="rId44"/>
+    <p:sldId id="305" r:id="rId45"/>
+    <p:sldId id="306" r:id="rId46"/>
+    <p:sldId id="307" r:id="rId47"/>
+    <p:sldId id="308" r:id="rId48"/>
+    <p:sldId id="309" r:id="rId49"/>
+    <p:sldId id="310" r:id="rId50"/>
+    <p:sldId id="311" r:id="rId51"/>
+    <p:sldId id="312" r:id="rId52"/>
     <p:sldId id="2147483643" r:id="rId17"/>
     <p:sldId id="2147483644" r:id="rId18"/>
     <p:sldId id="2147483645" r:id="rId19"/>
@@ -3202,6 +3203,36 @@
         <p14:creationId xmlns:p14="http://schemas.microsoft.com/office/powerpoint/2010/main" val="1163055812"/>
       </p:ext>
     </p:extLst>
+  </p:cSld>
+  <p:clrMapOvr>
+    <a:masterClrMapping/>
+  </p:clrMapOvr>
+</p:sldLayout>
+</file>
+
+<file path=ppt/slideLayouts/slideLayout5.xml><?xml version="1.0" encoding="utf-8"?>
+<p:sldLayout xmlns:a="http://schemas.openxmlformats.org/drawingml/2006/main" xmlns:r="http://schemas.openxmlformats.org/officeDocument/2006/relationships" xmlns:p="http://schemas.openxmlformats.org/presentationml/2006/main" preserve="1">
+  <p:cSld name="DEFAULT">
+    <p:bg>
+      <p:bgRef idx="1001">
+        <a:schemeClr val="bg1"/>
+      </p:bgRef>
+    </p:bg>
+    <p:spTree>
+      <p:nvGrpSpPr>
+        <p:cNvPr id="1" name=""/>
+        <p:cNvGrpSpPr/>
+        <p:nvPr/>
+      </p:nvGrpSpPr>
+      <p:grpSpPr>
+        <a:xfrm>
+          <a:off x="0" y="0"/>
+          <a:ext cx="0" cy="0"/>
+          <a:chOff x="0" y="0"/>
+          <a:chExt cx="0" cy="0"/>
+        </a:xfrm>
+      </p:grpSpPr>
+    </p:spTree>
   </p:cSld>
   <p:clrMapOvr>
     <a:masterClrMapping/>
@@ -5281,6 +5312,283 @@
 </p:sldMaster>
 </file>
 
+<file path=ppt/slideMasters/slideMaster2.xml><?xml version="1.0" encoding="utf-8"?>
+<p:sldMaster xmlns:a="http://schemas.openxmlformats.org/drawingml/2006/main" xmlns:r="http://schemas.openxmlformats.org/officeDocument/2006/relationships" xmlns:p="http://schemas.openxmlformats.org/presentationml/2006/main">
+  <p:cSld>
+    <p:spTree>
+      <p:nvGrpSpPr>
+        <p:cNvPr id="1" name=""/>
+        <p:cNvGrpSpPr/>
+        <p:nvPr/>
+      </p:nvGrpSpPr>
+      <p:grpSpPr>
+        <a:xfrm>
+          <a:off x="0" y="0"/>
+          <a:ext cx="0" cy="0"/>
+          <a:chOff x="0" y="0"/>
+          <a:chExt cx="0" cy="0"/>
+        </a:xfrm>
+      </p:grpSpPr>
+    </p:spTree>
+  </p:cSld>
+  <p:clrMap bg1="lt1" tx1="dk1" bg2="lt2" tx2="dk2" accent1="accent1" accent2="accent2" accent3="accent3" accent4="accent4" accent5="accent5" accent6="accent6" hlink="hlink" folHlink="folHlink"/>
+  <p:sldLayoutIdLst>
+    <p:sldLayoutId id="2147483649" r:id="rId1"/>
+  </p:sldLayoutIdLst>
+  <p:hf sldNum="0" hdr="0" ftr="0" dt="0"/>
+  <p:txStyles>
+    <p:titleStyle>
+      <a:lvl1pPr algn="ctr" defTabSz="914400" rtl="0" eaLnBrk="1" latinLnBrk="0" hangingPunct="1">
+        <a:spcBef>
+          <a:spcPct val="0"/>
+        </a:spcBef>
+        <a:buNone/>
+        <a:defRPr sz="5867" kern="1200">
+          <a:solidFill>
+            <a:schemeClr val="tx1"/>
+          </a:solidFill>
+          <a:latin typeface="+mj-lt"/>
+          <a:ea typeface="+mj-ea"/>
+          <a:cs typeface="+mj-cs"/>
+        </a:defRPr>
+      </a:lvl1pPr>
+    </p:titleStyle>
+    <p:bodyStyle>
+      <a:lvl1pPr marL="342900" indent="-342900" algn="l" defTabSz="914400" rtl="0" eaLnBrk="1" latinLnBrk="0" hangingPunct="1">
+        <a:spcBef>
+          <a:spcPct val="20000"/>
+        </a:spcBef>
+        <a:buFont typeface="Arial" pitchFamily="34" charset="0"/>
+        <a:buChar char="•"/>
+        <a:defRPr sz="4267" kern="1200">
+          <a:solidFill>
+            <a:schemeClr val="tx1"/>
+          </a:solidFill>
+          <a:latin typeface="+mn-lt"/>
+          <a:ea typeface="+mn-ea"/>
+          <a:cs typeface="+mn-cs"/>
+        </a:defRPr>
+      </a:lvl1pPr>
+      <a:lvl2pPr marL="742950" indent="-285750" algn="l" defTabSz="914400" rtl="0" eaLnBrk="1" latinLnBrk="0" hangingPunct="1">
+        <a:spcBef>
+          <a:spcPct val="20000"/>
+        </a:spcBef>
+        <a:buFont typeface="Arial" pitchFamily="34" charset="0"/>
+        <a:buChar char="–"/>
+        <a:defRPr sz="3733" kern="1200">
+          <a:solidFill>
+            <a:schemeClr val="tx1"/>
+          </a:solidFill>
+          <a:latin typeface="+mn-lt"/>
+          <a:ea typeface="+mn-ea"/>
+          <a:cs typeface="+mn-cs"/>
+        </a:defRPr>
+      </a:lvl2pPr>
+      <a:lvl3pPr marL="1143000" indent="-228600" algn="l" defTabSz="914400" rtl="0" eaLnBrk="1" latinLnBrk="0" hangingPunct="1">
+        <a:spcBef>
+          <a:spcPct val="20000"/>
+        </a:spcBef>
+        <a:buFont typeface="Arial" pitchFamily="34" charset="0"/>
+        <a:buChar char="•"/>
+        <a:defRPr sz="3200" kern="1200">
+          <a:solidFill>
+            <a:schemeClr val="tx1"/>
+          </a:solidFill>
+          <a:latin typeface="+mn-lt"/>
+          <a:ea typeface="+mn-ea"/>
+          <a:cs typeface="+mn-cs"/>
+        </a:defRPr>
+      </a:lvl3pPr>
+      <a:lvl4pPr marL="1600200" indent="-228600" algn="l" defTabSz="914400" rtl="0" eaLnBrk="1" latinLnBrk="0" hangingPunct="1">
+        <a:spcBef>
+          <a:spcPct val="20000"/>
+        </a:spcBef>
+        <a:buFont typeface="Arial" pitchFamily="34" charset="0"/>
+        <a:buChar char="–"/>
+        <a:defRPr sz="2667" kern="1200">
+          <a:solidFill>
+            <a:schemeClr val="tx1"/>
+          </a:solidFill>
+          <a:latin typeface="+mn-lt"/>
+          <a:ea typeface="+mn-ea"/>
+          <a:cs typeface="+mn-cs"/>
+        </a:defRPr>
+      </a:lvl4pPr>
+      <a:lvl5pPr marL="2057400" indent="-228600" algn="l" defTabSz="914400" rtl="0" eaLnBrk="1" latinLnBrk="0" hangingPunct="1">
+        <a:spcBef>
+          <a:spcPct val="20000"/>
+        </a:spcBef>
+        <a:buFont typeface="Arial" pitchFamily="34" charset="0"/>
+        <a:buChar char="»"/>
+        <a:defRPr sz="2667" kern="1200">
+          <a:solidFill>
+            <a:schemeClr val="tx1"/>
+          </a:solidFill>
+          <a:latin typeface="+mn-lt"/>
+          <a:ea typeface="+mn-ea"/>
+          <a:cs typeface="+mn-cs"/>
+        </a:defRPr>
+      </a:lvl5pPr>
+      <a:lvl6pPr marL="2514600" indent="-228600" algn="l" defTabSz="914400" rtl="0" eaLnBrk="1" latinLnBrk="0" hangingPunct="1">
+        <a:spcBef>
+          <a:spcPct val="20000"/>
+        </a:spcBef>
+        <a:buFont typeface="Arial" pitchFamily="34" charset="0"/>
+        <a:buChar char="•"/>
+        <a:defRPr sz="2667" kern="1200">
+          <a:solidFill>
+            <a:schemeClr val="tx1"/>
+          </a:solidFill>
+          <a:latin typeface="+mn-lt"/>
+          <a:ea typeface="+mn-ea"/>
+          <a:cs typeface="+mn-cs"/>
+        </a:defRPr>
+      </a:lvl6pPr>
+      <a:lvl7pPr marL="2971800" indent="-228600" algn="l" defTabSz="914400" rtl="0" eaLnBrk="1" latinLnBrk="0" hangingPunct="1">
+        <a:spcBef>
+          <a:spcPct val="20000"/>
+        </a:spcBef>
+        <a:buFont typeface="Arial" pitchFamily="34" charset="0"/>
+        <a:buChar char="•"/>
+        <a:defRPr sz="2667" kern="1200">
+          <a:solidFill>
+            <a:schemeClr val="tx1"/>
+          </a:solidFill>
+          <a:latin typeface="+mn-lt"/>
+          <a:ea typeface="+mn-ea"/>
+          <a:cs typeface="+mn-cs"/>
+        </a:defRPr>
+      </a:lvl7pPr>
+      <a:lvl8pPr marL="3429000" indent="-228600" algn="l" defTabSz="914400" rtl="0" eaLnBrk="1" latinLnBrk="0" hangingPunct="1">
+        <a:spcBef>
+          <a:spcPct val="20000"/>
+        </a:spcBef>
+        <a:buFont typeface="Arial" pitchFamily="34" charset="0"/>
+        <a:buChar char="•"/>
+        <a:defRPr sz="2667" kern="1200">
+          <a:solidFill>
+            <a:schemeClr val="tx1"/>
+          </a:solidFill>
+          <a:latin typeface="+mn-lt"/>
+          <a:ea typeface="+mn-ea"/>
+          <a:cs typeface="+mn-cs"/>
+        </a:defRPr>
+      </a:lvl8pPr>
+      <a:lvl9pPr marL="3886200" indent="-228600" algn="l" defTabSz="914400" rtl="0" eaLnBrk="1" latinLnBrk="0" hangingPunct="1">
+        <a:spcBef>
+          <a:spcPct val="20000"/>
+        </a:spcBef>
+        <a:buFont typeface="Arial" pitchFamily="34" charset="0"/>
+        <a:buChar char="•"/>
+        <a:defRPr sz="2667" kern="1200">
+          <a:solidFill>
+            <a:schemeClr val="tx1"/>
+          </a:solidFill>
+          <a:latin typeface="+mn-lt"/>
+          <a:ea typeface="+mn-ea"/>
+          <a:cs typeface="+mn-cs"/>
+        </a:defRPr>
+      </a:lvl9pPr>
+    </p:bodyStyle>
+    <p:otherStyle>
+      <a:defPPr>
+        <a:defRPr lang="en-US"/>
+      </a:defPPr>
+      <a:lvl1pPr marL="0" algn="l" defTabSz="914400" rtl="0" eaLnBrk="1" latinLnBrk="0" hangingPunct="1">
+        <a:defRPr sz="2400" kern="1200">
+          <a:solidFill>
+            <a:schemeClr val="tx1"/>
+          </a:solidFill>
+          <a:latin typeface="+mn-lt"/>
+          <a:ea typeface="+mn-ea"/>
+          <a:cs typeface="+mn-cs"/>
+        </a:defRPr>
+      </a:lvl1pPr>
+      <a:lvl2pPr marL="457200" algn="l" defTabSz="914400" rtl="0" eaLnBrk="1" latinLnBrk="0" hangingPunct="1">
+        <a:defRPr sz="2400" kern="1200">
+          <a:solidFill>
+            <a:schemeClr val="tx1"/>
+          </a:solidFill>
+          <a:latin typeface="+mn-lt"/>
+          <a:ea typeface="+mn-ea"/>
+          <a:cs typeface="+mn-cs"/>
+        </a:defRPr>
+      </a:lvl2pPr>
+      <a:lvl3pPr marL="914400" algn="l" defTabSz="914400" rtl="0" eaLnBrk="1" latinLnBrk="0" hangingPunct="1">
+        <a:defRPr sz="2400" kern="1200">
+          <a:solidFill>
+            <a:schemeClr val="tx1"/>
+          </a:solidFill>
+          <a:latin typeface="+mn-lt"/>
+          <a:ea typeface="+mn-ea"/>
+          <a:cs typeface="+mn-cs"/>
+        </a:defRPr>
+      </a:lvl3pPr>
+      <a:lvl4pPr marL="1371600" algn="l" defTabSz="914400" rtl="0" eaLnBrk="1" latinLnBrk="0" hangingPunct="1">
+        <a:defRPr sz="2400" kern="1200">
+          <a:solidFill>
+            <a:schemeClr val="tx1"/>
+          </a:solidFill>
+          <a:latin typeface="+mn-lt"/>
+          <a:ea typeface="+mn-ea"/>
+          <a:cs typeface="+mn-cs"/>
+        </a:defRPr>
+      </a:lvl4pPr>
+      <a:lvl5pPr marL="1828800" algn="l" defTabSz="914400" rtl="0" eaLnBrk="1" latinLnBrk="0" hangingPunct="1">
+        <a:defRPr sz="2400" kern="1200">
+          <a:solidFill>
+            <a:schemeClr val="tx1"/>
+          </a:solidFill>
+          <a:latin typeface="+mn-lt"/>
+          <a:ea typeface="+mn-ea"/>
+          <a:cs typeface="+mn-cs"/>
+        </a:defRPr>
+      </a:lvl5pPr>
+      <a:lvl6pPr marL="2286000" algn="l" defTabSz="914400" rtl="0" eaLnBrk="1" latinLnBrk="0" hangingPunct="1">
+        <a:defRPr sz="2400" kern="1200">
+          <a:solidFill>
+            <a:schemeClr val="tx1"/>
+          </a:solidFill>
+          <a:latin typeface="+mn-lt"/>
+          <a:ea typeface="+mn-ea"/>
+          <a:cs typeface="+mn-cs"/>
+        </a:defRPr>
+      </a:lvl6pPr>
+      <a:lvl7pPr marL="2743200" algn="l" defTabSz="914400" rtl="0" eaLnBrk="1" latinLnBrk="0" hangingPunct="1">
+        <a:defRPr sz="2400" kern="1200">
+          <a:solidFill>
+            <a:schemeClr val="tx1"/>
+          </a:solidFill>
+          <a:latin typeface="+mn-lt"/>
+          <a:ea typeface="+mn-ea"/>
+          <a:cs typeface="+mn-cs"/>
+        </a:defRPr>
+      </a:lvl7pPr>
+      <a:lvl8pPr marL="3200400" algn="l" defTabSz="914400" rtl="0" eaLnBrk="1" latinLnBrk="0" hangingPunct="1">
+        <a:defRPr sz="2400" kern="1200">
+          <a:solidFill>
+            <a:schemeClr val="tx1"/>
+          </a:solidFill>
+          <a:latin typeface="+mn-lt"/>
+          <a:ea typeface="+mn-ea"/>
+          <a:cs typeface="+mn-cs"/>
+        </a:defRPr>
+      </a:lvl8pPr>
+      <a:lvl9pPr marL="3657600" algn="l" defTabSz="914400" rtl="0" eaLnBrk="1" latinLnBrk="0" hangingPunct="1">
+        <a:defRPr sz="2400" kern="1200">
+          <a:solidFill>
+            <a:schemeClr val="tx1"/>
+          </a:solidFill>
+          <a:latin typeface="+mn-lt"/>
+          <a:ea typeface="+mn-ea"/>
+          <a:cs typeface="+mn-cs"/>
+        </a:defRPr>
+      </a:lvl9pPr>
+    </p:otherStyle>
+  </p:txStyles>
+</p:sldMaster>
+</file>
+
 <file path=ppt/slides/slide1.xml><?xml version="1.0" encoding="utf-8"?>
 <p:sld xmlns:a="http://schemas.openxmlformats.org/drawingml/2006/main" xmlns:p="http://schemas.openxmlformats.org/presentationml/2006/main" xmlns:r="http://schemas.openxmlformats.org/officeDocument/2006/relationships">
   <p:cSld>
@@ -5417,7 +5725,7 @@
 </file>
 
 <file path=ppt/slides/slide10.xml><?xml version="1.0" encoding="utf-8"?>
-<p:sld xmlns:a="http://schemas.openxmlformats.org/drawingml/2006/main" xmlns:p="http://schemas.openxmlformats.org/presentationml/2006/main" xmlns:r="http://schemas.openxmlformats.org/officeDocument/2006/relationships">
+<p:sld xmlns:a="http://schemas.openxmlformats.org/drawingml/2006/main" xmlns:r="http://schemas.openxmlformats.org/officeDocument/2006/relationships" xmlns:p="http://schemas.openxmlformats.org/presentationml/2006/main">
   <p:cSld name="Slide 4">
     <p:spTree>
       <p:nvGrpSpPr>
@@ -5442,7 +5750,7 @@
           <p:nvPr/>
         </p:nvPicPr>
         <p:blipFill>
-          <a:blip r:embed="rId2"/>
+          <a:blip r:embed="rId1"/>
           <a:stretch>
             <a:fillRect/>
           </a:stretch>
@@ -6833,7 +7141,7 @@
 </file>
 
 <file path=ppt/slides/slide11.xml><?xml version="1.0" encoding="utf-8"?>
-<p:sld xmlns:a="http://schemas.openxmlformats.org/drawingml/2006/main" xmlns:p="http://schemas.openxmlformats.org/presentationml/2006/main" xmlns:r="http://schemas.openxmlformats.org/officeDocument/2006/relationships">
+<p:sld xmlns:a="http://schemas.openxmlformats.org/drawingml/2006/main" xmlns:r="http://schemas.openxmlformats.org/officeDocument/2006/relationships" xmlns:p="http://schemas.openxmlformats.org/presentationml/2006/main">
   <p:cSld name="Slide 5">
     <p:spTree>
       <p:nvGrpSpPr>
@@ -6858,7 +7166,7 @@
           <p:nvPr/>
         </p:nvPicPr>
         <p:blipFill>
-          <a:blip r:embed="rId2"/>
+          <a:blip r:embed="rId1"/>
           <a:stretch>
             <a:fillRect/>
           </a:stretch>
@@ -8307,7 +8615,7 @@
 </file>
 
 <file path=ppt/slides/slide12.xml><?xml version="1.0" encoding="utf-8"?>
-<p:sld xmlns:a="http://schemas.openxmlformats.org/drawingml/2006/main" xmlns:p="http://schemas.openxmlformats.org/presentationml/2006/main" xmlns:r="http://schemas.openxmlformats.org/officeDocument/2006/relationships">
+<p:sld xmlns:a="http://schemas.openxmlformats.org/drawingml/2006/main" xmlns:r="http://schemas.openxmlformats.org/officeDocument/2006/relationships" xmlns:p="http://schemas.openxmlformats.org/presentationml/2006/main">
   <p:cSld name="Slide 6">
     <p:spTree>
       <p:nvGrpSpPr>
@@ -8332,7 +8640,7 @@
           <p:nvPr/>
         </p:nvPicPr>
         <p:blipFill>
-          <a:blip r:embed="rId2"/>
+          <a:blip r:embed="rId1"/>
           <a:stretch>
             <a:fillRect/>
           </a:stretch>
@@ -10042,7 +10350,7 @@
 </file>
 
 <file path=ppt/slides/slide13.xml><?xml version="1.0" encoding="utf-8"?>
-<p:sld xmlns:a="http://schemas.openxmlformats.org/drawingml/2006/main" xmlns:p="http://schemas.openxmlformats.org/presentationml/2006/main" xmlns:r="http://schemas.openxmlformats.org/officeDocument/2006/relationships">
+<p:sld xmlns:a="http://schemas.openxmlformats.org/drawingml/2006/main" xmlns:r="http://schemas.openxmlformats.org/officeDocument/2006/relationships" xmlns:p="http://schemas.openxmlformats.org/presentationml/2006/main">
   <p:cSld name="Slide 7">
     <p:spTree>
       <p:nvGrpSpPr>
@@ -10067,7 +10375,7 @@
           <p:nvPr/>
         </p:nvPicPr>
         <p:blipFill>
-          <a:blip r:embed="rId2"/>
+          <a:blip r:embed="rId1"/>
           <a:stretch>
             <a:fillRect/>
           </a:stretch>
@@ -11584,7 +11892,7 @@
 </file>
 
 <file path=ppt/slides/slide14.xml><?xml version="1.0" encoding="utf-8"?>
-<p:sld xmlns:a="http://schemas.openxmlformats.org/drawingml/2006/main" xmlns:p="http://schemas.openxmlformats.org/presentationml/2006/main" xmlns:r="http://schemas.openxmlformats.org/officeDocument/2006/relationships">
+<p:sld xmlns:a="http://schemas.openxmlformats.org/drawingml/2006/main" xmlns:r="http://schemas.openxmlformats.org/officeDocument/2006/relationships" xmlns:p="http://schemas.openxmlformats.org/presentationml/2006/main">
   <p:cSld name="Slide 8">
     <p:spTree>
       <p:nvGrpSpPr>
@@ -11609,7 +11917,7 @@
           <p:nvPr/>
         </p:nvPicPr>
         <p:blipFill>
-          <a:blip r:embed="rId2"/>
+          <a:blip r:embed="rId1"/>
           <a:stretch>
             <a:fillRect/>
           </a:stretch>
@@ -13246,7 +13554,7 @@
 </file>
 
 <file path=ppt/slides/slide15.xml><?xml version="1.0" encoding="utf-8"?>
-<p:sld xmlns:a="http://schemas.openxmlformats.org/drawingml/2006/main" xmlns:p="http://schemas.openxmlformats.org/presentationml/2006/main" xmlns:r="http://schemas.openxmlformats.org/officeDocument/2006/relationships">
+<p:sld xmlns:a="http://schemas.openxmlformats.org/drawingml/2006/main" xmlns:r="http://schemas.openxmlformats.org/officeDocument/2006/relationships" xmlns:p="http://schemas.openxmlformats.org/presentationml/2006/main">
   <p:cSld name="Slide 9">
     <p:spTree>
       <p:nvGrpSpPr>
@@ -13271,7 +13579,7 @@
           <p:nvPr/>
         </p:nvPicPr>
         <p:blipFill>
-          <a:blip r:embed="rId2"/>
+          <a:blip r:embed="rId1"/>
           <a:stretch>
             <a:fillRect/>
           </a:stretch>
@@ -14846,7 +15154,7 @@
 </file>
 
 <file path=ppt/slides/slide16.xml><?xml version="1.0" encoding="utf-8"?>
-<p:sld xmlns:a="http://schemas.openxmlformats.org/drawingml/2006/main" xmlns:p="http://schemas.openxmlformats.org/presentationml/2006/main" xmlns:r="http://schemas.openxmlformats.org/officeDocument/2006/relationships">
+<p:sld xmlns:a="http://schemas.openxmlformats.org/drawingml/2006/main" xmlns:r="http://schemas.openxmlformats.org/officeDocument/2006/relationships" xmlns:p="http://schemas.openxmlformats.org/presentationml/2006/main">
   <p:cSld name="Slide 10">
     <p:spTree>
       <p:nvGrpSpPr>
@@ -14871,7 +15179,7 @@
           <p:nvPr/>
         </p:nvPicPr>
         <p:blipFill>
-          <a:blip r:embed="rId2"/>
+          <a:blip r:embed="rId1"/>
           <a:stretch>
             <a:fillRect/>
           </a:stretch>
@@ -16049,7 +16357,7 @@
 </file>
 
 <file path=ppt/slides/slide17.xml><?xml version="1.0" encoding="utf-8"?>
-<p:sld xmlns:a="http://schemas.openxmlformats.org/drawingml/2006/main" xmlns:p="http://schemas.openxmlformats.org/presentationml/2006/main" xmlns:r="http://schemas.openxmlformats.org/officeDocument/2006/relationships">
+<p:sld xmlns:a="http://schemas.openxmlformats.org/drawingml/2006/main" xmlns:r="http://schemas.openxmlformats.org/officeDocument/2006/relationships" xmlns:p="http://schemas.openxmlformats.org/presentationml/2006/main">
   <p:cSld name="Slide 11">
     <p:spTree>
       <p:nvGrpSpPr>
@@ -16074,7 +16382,7 @@
           <p:nvPr/>
         </p:nvPicPr>
         <p:blipFill>
-          <a:blip r:embed="rId2"/>
+          <a:blip r:embed="rId1"/>
           <a:stretch>
             <a:fillRect/>
           </a:stretch>
@@ -17235,7 +17543,7 @@
 </file>
 
 <file path=ppt/slides/slide18.xml><?xml version="1.0" encoding="utf-8"?>
-<p:sld xmlns:a="http://schemas.openxmlformats.org/drawingml/2006/main" xmlns:p="http://schemas.openxmlformats.org/presentationml/2006/main" xmlns:r="http://schemas.openxmlformats.org/officeDocument/2006/relationships">
+<p:sld xmlns:a="http://schemas.openxmlformats.org/drawingml/2006/main" xmlns:r="http://schemas.openxmlformats.org/officeDocument/2006/relationships" xmlns:p="http://schemas.openxmlformats.org/presentationml/2006/main">
   <p:cSld name="Slide 12">
     <p:spTree>
       <p:nvGrpSpPr>
@@ -17260,7 +17568,7 @@
           <p:nvPr/>
         </p:nvPicPr>
         <p:blipFill>
-          <a:blip r:embed="rId2"/>
+          <a:blip r:embed="rId1"/>
           <a:stretch>
             <a:fillRect/>
           </a:stretch>
@@ -19415,7 +19723,7 @@
 </file>
 
 <file path=ppt/slides/slide19.xml><?xml version="1.0" encoding="utf-8"?>
-<p:sld xmlns:a="http://schemas.openxmlformats.org/drawingml/2006/main" xmlns:p="http://schemas.openxmlformats.org/presentationml/2006/main" xmlns:r="http://schemas.openxmlformats.org/officeDocument/2006/relationships">
+<p:sld xmlns:a="http://schemas.openxmlformats.org/drawingml/2006/main" xmlns:r="http://schemas.openxmlformats.org/officeDocument/2006/relationships" xmlns:p="http://schemas.openxmlformats.org/presentationml/2006/main">
   <p:cSld name="Slide 13">
     <p:spTree>
       <p:nvGrpSpPr>
@@ -19499,7 +19807,7 @@
           <p:nvPr/>
         </p:nvPicPr>
         <p:blipFill>
-          <a:blip r:embed="rId2"/>
+          <a:blip r:embed="rId1"/>
           <a:stretch>
             <a:fillRect/>
           </a:stretch>
@@ -25471,7 +25779,7 @@
 </file>
 
 <file path=ppt/slides/slide7.xml><?xml version="1.0" encoding="utf-8"?>
-<p:sld xmlns:a="http://schemas.openxmlformats.org/drawingml/2006/main" xmlns:p="http://schemas.openxmlformats.org/presentationml/2006/main" xmlns:r="http://schemas.openxmlformats.org/officeDocument/2006/relationships">
+<p:sld xmlns:a="http://schemas.openxmlformats.org/drawingml/2006/main" xmlns:r="http://schemas.openxmlformats.org/officeDocument/2006/relationships" xmlns:p="http://schemas.openxmlformats.org/presentationml/2006/main">
   <p:cSld name="Slide 1">
     <p:spTree>
       <p:nvGrpSpPr>
@@ -25496,7 +25804,7 @@
           <p:nvPr/>
         </p:nvPicPr>
         <p:blipFill>
-          <a:blip r:embed="rId3"/>
+          <a:blip r:embed="rId1"/>
           <a:stretch>
             <a:fillRect/>
           </a:stretch>
@@ -25676,7 +25984,7 @@
           <p:nvPr/>
         </p:nvPicPr>
         <p:blipFill>
-          <a:blip r:embed="rId3"/>
+          <a:blip r:embed="rId2"/>
           <a:stretch>
             <a:fillRect/>
           </a:stretch>
@@ -25700,7 +26008,7 @@
 </file>
 
 <file path=ppt/slides/slide8.xml><?xml version="1.0" encoding="utf-8"?>
-<p:sld xmlns:a="http://schemas.openxmlformats.org/drawingml/2006/main" xmlns:p="http://schemas.openxmlformats.org/presentationml/2006/main" xmlns:r="http://schemas.openxmlformats.org/officeDocument/2006/relationships">
+<p:sld xmlns:a="http://schemas.openxmlformats.org/drawingml/2006/main" xmlns:r="http://schemas.openxmlformats.org/officeDocument/2006/relationships" xmlns:p="http://schemas.openxmlformats.org/presentationml/2006/main">
   <p:cSld name="Slide 2">
     <p:spTree>
       <p:nvGrpSpPr>
@@ -25725,7 +26033,7 @@
           <p:nvPr/>
         </p:nvPicPr>
         <p:blipFill>
-          <a:blip r:embed="rId2"/>
+          <a:blip r:embed="rId1"/>
           <a:stretch>
             <a:fillRect/>
           </a:stretch>
@@ -26521,7 +26829,7 @@
 </file>
 
 <file path=ppt/slides/slide9.xml><?xml version="1.0" encoding="utf-8"?>
-<p:sld xmlns:a="http://schemas.openxmlformats.org/drawingml/2006/main" xmlns:p="http://schemas.openxmlformats.org/presentationml/2006/main" xmlns:r="http://schemas.openxmlformats.org/officeDocument/2006/relationships">
+<p:sld xmlns:a="http://schemas.openxmlformats.org/drawingml/2006/main" xmlns:r="http://schemas.openxmlformats.org/officeDocument/2006/relationships" xmlns:p="http://schemas.openxmlformats.org/presentationml/2006/main">
   <p:cSld name="Slide 3">
     <p:spTree>
       <p:nvGrpSpPr>
@@ -26546,7 +26854,7 @@
           <p:nvPr/>
         </p:nvPicPr>
         <p:blipFill>
-          <a:blip r:embed="rId2"/>
+          <a:blip r:embed="rId1"/>
           <a:stretch>
             <a:fillRect/>
           </a:stretch>
@@ -27843,6 +28151,301 @@
 </a:theme>
 </file>
 
+<file path=ppt/theme/theme3.xml><?xml version="1.0" encoding="utf-8"?>
+<a:theme xmlns:a="http://schemas.openxmlformats.org/drawingml/2006/main" name="Office Theme">
+  <a:themeElements>
+    <a:clrScheme name="Office">
+      <a:dk1>
+        <a:sysClr val="windowText" lastClr="000000"/>
+      </a:dk1>
+      <a:lt1>
+        <a:sysClr val="window" lastClr="FFFFFF"/>
+      </a:lt1>
+      <a:dk2>
+        <a:srgbClr val="44546A"/>
+      </a:dk2>
+      <a:lt2>
+        <a:srgbClr val="E7E6E6"/>
+      </a:lt2>
+      <a:accent1>
+        <a:srgbClr val="4472C4"/>
+      </a:accent1>
+      <a:accent2>
+        <a:srgbClr val="ED7D31"/>
+      </a:accent2>
+      <a:accent3>
+        <a:srgbClr val="A5A5A5"/>
+      </a:accent3>
+      <a:accent4>
+        <a:srgbClr val="FFC000"/>
+      </a:accent4>
+      <a:accent5>
+        <a:srgbClr val="5B9BD5"/>
+      </a:accent5>
+      <a:accent6>
+        <a:srgbClr val="70AD47"/>
+      </a:accent6>
+      <a:hlink>
+        <a:srgbClr val="0563C1"/>
+      </a:hlink>
+      <a:folHlink>
+        <a:srgbClr val="954F72"/>
+      </a:folHlink>
+    </a:clrScheme>
+    <a:fontScheme name="Office">
+      <a:majorFont>
+        <a:latin typeface="Calibri Light" panose="020F0302020204030204"/>
+        <a:ea typeface=""/>
+        <a:cs typeface=""/>
+        <a:font script="Jpan" typeface="游ゴシック Light"/>
+        <a:font script="Hang" typeface="맑은 고딕"/>
+        <a:font script="Hans" typeface="等线 Light"/>
+        <a:font script="Hant" typeface="新細明體"/>
+        <a:font script="Arab" typeface="Times New Roman"/>
+        <a:font script="Hebr" typeface="Times New Roman"/>
+        <a:font script="Thai" typeface="Angsana New"/>
+        <a:font script="Ethi" typeface="Nyala"/>
+        <a:font script="Beng" typeface="Vrinda"/>
+        <a:font script="Gujr" typeface="Shruti"/>
+        <a:font script="Khmr" typeface="MoolBoran"/>
+        <a:font script="Knda" typeface="Tunga"/>
+        <a:font script="Guru" typeface="Raavi"/>
+        <a:font script="Cans" typeface="Euphemia"/>
+        <a:font script="Cher" typeface="Plantagenet Cherokee"/>
+        <a:font script="Yiii" typeface="Microsoft Yi Baiti"/>
+        <a:font script="Tibt" typeface="Microsoft Himalaya"/>
+        <a:font script="Thaa" typeface="MV Boli"/>
+        <a:font script="Deva" typeface="Mangal"/>
+        <a:font script="Telu" typeface="Gautami"/>
+        <a:font script="Taml" typeface="Latha"/>
+        <a:font script="Syrc" typeface="Estrangelo Edessa"/>
+        <a:font script="Orya" typeface="Kalinga"/>
+        <a:font script="Mlym" typeface="Kartika"/>
+        <a:font script="Laoo" typeface="DokChampa"/>
+        <a:font script="Sinh" typeface="Iskoola Pota"/>
+        <a:font script="Mong" typeface="Mongolian Baiti"/>
+        <a:font script="Viet" typeface="Times New Roman"/>
+        <a:font script="Uigh" typeface="Microsoft Uighur"/>
+        <a:font script="Geor" typeface="Sylfaen"/>
+        <a:font script="Armn" typeface="Arial"/>
+        <a:font script="Bugi" typeface="Leelawadee UI"/>
+        <a:font script="Bopo" typeface="Microsoft JhengHei"/>
+        <a:font script="Java" typeface="Javanese Text"/>
+        <a:font script="Lisu" typeface="Segoe UI"/>
+        <a:font script="Mymr" typeface="Myanmar Text"/>
+        <a:font script="Nkoo" typeface="Ebrima"/>
+        <a:font script="Olck" typeface="Nirmala UI"/>
+        <a:font script="Osma" typeface="Ebrima"/>
+        <a:font script="Phag" typeface="Phagspa"/>
+        <a:font script="Syrn" typeface="Estrangelo Edessa"/>
+        <a:font script="Syrj" typeface="Estrangelo Edessa"/>
+        <a:font script="Syre" typeface="Estrangelo Edessa"/>
+        <a:font script="Sora" typeface="Nirmala UI"/>
+        <a:font script="Tale" typeface="Microsoft Tai Le"/>
+        <a:font script="Talu" typeface="Microsoft New Tai Lue"/>
+        <a:font script="Tfng" typeface="Ebrima"/>
+      </a:majorFont>
+      <a:minorFont>
+        <a:latin typeface="Calibri" panose="020F0502020204030204"/>
+        <a:ea typeface=""/>
+        <a:cs typeface=""/>
+        <a:font script="Jpan" typeface="游ゴシック"/>
+        <a:font script="Hang" typeface="맑은 고딕"/>
+        <a:font script="Hans" typeface="等线"/>
+        <a:font script="Hant" typeface="新細明體"/>
+        <a:font script="Arab" typeface="Arial"/>
+        <a:font script="Hebr" typeface="Arial"/>
+        <a:font script="Thai" typeface="Cordia New"/>
+        <a:font script="Ethi" typeface="Nyala"/>
+        <a:font script="Beng" typeface="Vrinda"/>
+        <a:font script="Gujr" typeface="Shruti"/>
+        <a:font script="Khmr" typeface="DaunPenh"/>
+        <a:font script="Knda" typeface="Tunga"/>
+        <a:font script="Guru" typeface="Raavi"/>
+        <a:font script="Cans" typeface="Euphemia"/>
+        <a:font script="Cher" typeface="Plantagenet Cherokee"/>
+        <a:font script="Yiii" typeface="Microsoft Yi Baiti"/>
+        <a:font script="Tibt" typeface="Microsoft Himalaya"/>
+        <a:font script="Thaa" typeface="MV Boli"/>
+        <a:font script="Deva" typeface="Mangal"/>
+        <a:font script="Telu" typeface="Gautami"/>
+        <a:font script="Taml" typeface="Latha"/>
+        <a:font script="Syrc" typeface="Estrangelo Edessa"/>
+        <a:font script="Orya" typeface="Kalinga"/>
+        <a:font script="Mlym" typeface="Kartika"/>
+        <a:font script="Laoo" typeface="DokChampa"/>
+        <a:font script="Sinh" typeface="Iskoola Pota"/>
+        <a:font script="Mong" typeface="Mongolian Baiti"/>
+        <a:font script="Viet" typeface="Arial"/>
+        <a:font script="Uigh" typeface="Microsoft Uighur"/>
+        <a:font script="Geor" typeface="Sylfaen"/>
+        <a:font script="Armn" typeface="Arial"/>
+        <a:font script="Bugi" typeface="Leelawadee UI"/>
+        <a:font script="Bopo" typeface="Microsoft JhengHei"/>
+        <a:font script="Java" typeface="Javanese Text"/>
+        <a:font script="Lisu" typeface="Segoe UI"/>
+        <a:font script="Mymr" typeface="Myanmar Text"/>
+        <a:font script="Nkoo" typeface="Ebrima"/>
+        <a:font script="Olck" typeface="Nirmala UI"/>
+        <a:font script="Osma" typeface="Ebrima"/>
+        <a:font script="Phag" typeface="Phagspa"/>
+        <a:font script="Syrn" typeface="Estrangelo Edessa"/>
+        <a:font script="Syrj" typeface="Estrangelo Edessa"/>
+        <a:font script="Syre" typeface="Estrangelo Edessa"/>
+        <a:font script="Sora" typeface="Nirmala UI"/>
+        <a:font script="Tale" typeface="Microsoft Tai Le"/>
+        <a:font script="Talu" typeface="Microsoft New Tai Lue"/>
+        <a:font script="Tfng" typeface="Ebrima"/>
+      </a:minorFont>
+    </a:fontScheme>
+    <a:fmtScheme name="Office">
+      <a:fillStyleLst>
+        <a:solidFill>
+          <a:schemeClr val="phClr"/>
+        </a:solidFill>
+        <a:gradFill rotWithShape="1">
+          <a:gsLst>
+            <a:gs pos="0">
+              <a:schemeClr val="phClr">
+                <a:lumMod val="110000"/>
+                <a:satMod val="105000"/>
+                <a:tint val="67000"/>
+              </a:schemeClr>
+            </a:gs>
+            <a:gs pos="50000">
+              <a:schemeClr val="phClr">
+                <a:lumMod val="105000"/>
+                <a:satMod val="103000"/>
+                <a:tint val="73000"/>
+              </a:schemeClr>
+            </a:gs>
+            <a:gs pos="100000">
+              <a:schemeClr val="phClr">
+                <a:lumMod val="105000"/>
+                <a:satMod val="109000"/>
+                <a:tint val="81000"/>
+              </a:schemeClr>
+            </a:gs>
+          </a:gsLst>
+          <a:lin ang="5400000" scaled="0"/>
+        </a:gradFill>
+        <a:gradFill rotWithShape="1">
+          <a:gsLst>
+            <a:gs pos="0">
+              <a:schemeClr val="phClr">
+                <a:satMod val="103000"/>
+                <a:lumMod val="102000"/>
+                <a:tint val="94000"/>
+              </a:schemeClr>
+            </a:gs>
+            <a:gs pos="50000">
+              <a:schemeClr val="phClr">
+                <a:satMod val="110000"/>
+                <a:lumMod val="100000"/>
+                <a:shade val="100000"/>
+              </a:schemeClr>
+            </a:gs>
+            <a:gs pos="100000">
+              <a:schemeClr val="phClr">
+                <a:lumMod val="99000"/>
+                <a:satMod val="120000"/>
+                <a:shade val="78000"/>
+              </a:schemeClr>
+            </a:gs>
+          </a:gsLst>
+          <a:lin ang="5400000" scaled="0"/>
+        </a:gradFill>
+      </a:fillStyleLst>
+      <a:lnStyleLst>
+        <a:ln w="6350" cap="flat" cmpd="sng" algn="ctr">
+          <a:solidFill>
+            <a:schemeClr val="phClr"/>
+          </a:solidFill>
+          <a:prstDash val="solid"/>
+          <a:miter lim="800000"/>
+        </a:ln>
+        <a:ln w="12700" cap="flat" cmpd="sng" algn="ctr">
+          <a:solidFill>
+            <a:schemeClr val="phClr"/>
+          </a:solidFill>
+          <a:prstDash val="solid"/>
+          <a:miter lim="800000"/>
+        </a:ln>
+        <a:ln w="19050" cap="flat" cmpd="sng" algn="ctr">
+          <a:solidFill>
+            <a:schemeClr val="phClr"/>
+          </a:solidFill>
+          <a:prstDash val="solid"/>
+          <a:miter lim="800000"/>
+        </a:ln>
+      </a:lnStyleLst>
+      <a:effectStyleLst>
+        <a:effectStyle>
+          <a:effectLst/>
+        </a:effectStyle>
+        <a:effectStyle>
+          <a:effectLst/>
+        </a:effectStyle>
+        <a:effectStyle>
+          <a:effectLst>
+            <a:outerShdw blurRad="57150" dist="19050" dir="5400000" algn="ctr" rotWithShape="0">
+              <a:srgbClr val="000000">
+                <a:alpha val="63000"/>
+              </a:srgbClr>
+            </a:outerShdw>
+          </a:effectLst>
+        </a:effectStyle>
+      </a:effectStyleLst>
+      <a:bgFillStyleLst>
+        <a:solidFill>
+          <a:schemeClr val="phClr"/>
+        </a:solidFill>
+        <a:solidFill>
+          <a:schemeClr val="phClr">
+            <a:tint val="95000"/>
+            <a:satMod val="170000"/>
+          </a:schemeClr>
+        </a:solidFill>
+        <a:gradFill rotWithShape="1">
+          <a:gsLst>
+            <a:gs pos="0">
+              <a:schemeClr val="phClr">
+                <a:tint val="93000"/>
+                <a:satMod val="150000"/>
+                <a:shade val="98000"/>
+                <a:lumMod val="102000"/>
+              </a:schemeClr>
+            </a:gs>
+            <a:gs pos="50000">
+              <a:schemeClr val="phClr">
+                <a:tint val="98000"/>
+                <a:satMod val="130000"/>
+                <a:shade val="90000"/>
+                <a:lumMod val="103000"/>
+              </a:schemeClr>
+            </a:gs>
+            <a:gs pos="100000">
+              <a:schemeClr val="phClr">
+                <a:shade val="63000"/>
+                <a:satMod val="120000"/>
+              </a:schemeClr>
+            </a:gs>
+          </a:gsLst>
+          <a:lin ang="5400000" scaled="0"/>
+        </a:gradFill>
+      </a:bgFillStyleLst>
+    </a:fmtScheme>
+  </a:themeElements>
+  <a:objectDefaults/>
+  <a:extraClrSchemeLst/>
+  <a:extLst>
+    <a:ext uri="{05A4C25C-085E-4340-85A3-A5531E510DB2}">
+      <thm15:themeFamily xmlns:thm15="http://schemas.microsoft.com/office/thememl/2012/main" name="Office Theme" id="{62F939B6-93AF-4DB8-9C6B-D6C7DFDC589F}" vid="{4A3C46E8-61CC-4603-A589-7422A47A8E4A}"/>
+    </a:ext>
+  </a:extLst>
+</a:theme>
+</file>
+
 <file path=customXml/item1.xml><?xml version="1.0" encoding="utf-8"?>
 <?mso-contentType ?>
 <FormTemplates xmlns="http://schemas.microsoft.com/sharepoint/v3/contenttype/forms">

</xml_diff>